<commit_message>
added lesson3 homework to research assigments
</commit_message>
<xml_diff>
--- a/research assignments.pptx
+++ b/research assignments.pptx
@@ -12,6 +12,8 @@
     <p:sldId id="260" r:id="rId6"/>
     <p:sldId id="261" r:id="rId7"/>
     <p:sldId id="262" r:id="rId8"/>
+    <p:sldId id="263" r:id="rId9"/>
+    <p:sldId id="264" r:id="rId10"/>
   </p:sldIdLst>
   <p:sldSz cx="12192000" cy="6858000"/>
   <p:notesSz cx="6858000" cy="9144000"/>
@@ -128,7 +130,16 @@
             <p14:sldId id="262"/>
           </p14:sldIdLst>
         </p14:section>
+        <p14:section name="Lesson3 Homework" id="{F405CB77-46BF-431D-8FAF-4886F33E595A}">
+          <p14:sldIdLst>
+            <p14:sldId id="263"/>
+            <p14:sldId id="264"/>
+          </p14:sldIdLst>
+        </p14:section>
       </p14:sectionLst>
+    </p:ext>
+    <p:ext uri="{EFAFB233-063F-42B5-8137-9DF3F51BA10A}">
+      <p15:sldGuideLst xmlns:p15="http://schemas.microsoft.com/office/powerpoint/2012/main"/>
     </p:ext>
   </p:extLst>
 </p:presentation>
@@ -281,7 +292,7 @@
           <a:p>
             <a:fld id="{27CD8FDA-3F50-4BD8-9920-4DC7AE6B014B}" type="datetimeFigureOut">
               <a:rPr lang="tr-TR" smtClean="0"/>
-              <a:t>25.05.2022</a:t>
+              <a:t>30.05.2022</a:t>
             </a:fld>
             <a:endParaRPr lang="tr-TR"/>
           </a:p>
@@ -479,7 +490,7 @@
           <a:p>
             <a:fld id="{27CD8FDA-3F50-4BD8-9920-4DC7AE6B014B}" type="datetimeFigureOut">
               <a:rPr lang="tr-TR" smtClean="0"/>
-              <a:t>25.05.2022</a:t>
+              <a:t>30.05.2022</a:t>
             </a:fld>
             <a:endParaRPr lang="tr-TR"/>
           </a:p>
@@ -687,7 +698,7 @@
           <a:p>
             <a:fld id="{27CD8FDA-3F50-4BD8-9920-4DC7AE6B014B}" type="datetimeFigureOut">
               <a:rPr lang="tr-TR" smtClean="0"/>
-              <a:t>25.05.2022</a:t>
+              <a:t>30.05.2022</a:t>
             </a:fld>
             <a:endParaRPr lang="tr-TR"/>
           </a:p>
@@ -885,7 +896,7 @@
           <a:p>
             <a:fld id="{27CD8FDA-3F50-4BD8-9920-4DC7AE6B014B}" type="datetimeFigureOut">
               <a:rPr lang="tr-TR" smtClean="0"/>
-              <a:t>25.05.2022</a:t>
+              <a:t>30.05.2022</a:t>
             </a:fld>
             <a:endParaRPr lang="tr-TR"/>
           </a:p>
@@ -1160,7 +1171,7 @@
           <a:p>
             <a:fld id="{27CD8FDA-3F50-4BD8-9920-4DC7AE6B014B}" type="datetimeFigureOut">
               <a:rPr lang="tr-TR" smtClean="0"/>
-              <a:t>25.05.2022</a:t>
+              <a:t>30.05.2022</a:t>
             </a:fld>
             <a:endParaRPr lang="tr-TR"/>
           </a:p>
@@ -1425,7 +1436,7 @@
           <a:p>
             <a:fld id="{27CD8FDA-3F50-4BD8-9920-4DC7AE6B014B}" type="datetimeFigureOut">
               <a:rPr lang="tr-TR" smtClean="0"/>
-              <a:t>25.05.2022</a:t>
+              <a:t>30.05.2022</a:t>
             </a:fld>
             <a:endParaRPr lang="tr-TR"/>
           </a:p>
@@ -1837,7 +1848,7 @@
           <a:p>
             <a:fld id="{27CD8FDA-3F50-4BD8-9920-4DC7AE6B014B}" type="datetimeFigureOut">
               <a:rPr lang="tr-TR" smtClean="0"/>
-              <a:t>25.05.2022</a:t>
+              <a:t>30.05.2022</a:t>
             </a:fld>
             <a:endParaRPr lang="tr-TR"/>
           </a:p>
@@ -1978,7 +1989,7 @@
           <a:p>
             <a:fld id="{27CD8FDA-3F50-4BD8-9920-4DC7AE6B014B}" type="datetimeFigureOut">
               <a:rPr lang="tr-TR" smtClean="0"/>
-              <a:t>25.05.2022</a:t>
+              <a:t>30.05.2022</a:t>
             </a:fld>
             <a:endParaRPr lang="tr-TR"/>
           </a:p>
@@ -2091,7 +2102,7 @@
           <a:p>
             <a:fld id="{27CD8FDA-3F50-4BD8-9920-4DC7AE6B014B}" type="datetimeFigureOut">
               <a:rPr lang="tr-TR" smtClean="0"/>
-              <a:t>25.05.2022</a:t>
+              <a:t>30.05.2022</a:t>
             </a:fld>
             <a:endParaRPr lang="tr-TR"/>
           </a:p>
@@ -2402,7 +2413,7 @@
           <a:p>
             <a:fld id="{27CD8FDA-3F50-4BD8-9920-4DC7AE6B014B}" type="datetimeFigureOut">
               <a:rPr lang="tr-TR" smtClean="0"/>
-              <a:t>25.05.2022</a:t>
+              <a:t>30.05.2022</a:t>
             </a:fld>
             <a:endParaRPr lang="tr-TR"/>
           </a:p>
@@ -2690,7 +2701,7 @@
           <a:p>
             <a:fld id="{27CD8FDA-3F50-4BD8-9920-4DC7AE6B014B}" type="datetimeFigureOut">
               <a:rPr lang="tr-TR" smtClean="0"/>
-              <a:t>25.05.2022</a:t>
+              <a:t>30.05.2022</a:t>
             </a:fld>
             <a:endParaRPr lang="tr-TR"/>
           </a:p>
@@ -2931,7 +2942,7 @@
           <a:p>
             <a:fld id="{27CD8FDA-3F50-4BD8-9920-4DC7AE6B014B}" type="datetimeFigureOut">
               <a:rPr lang="tr-TR" smtClean="0"/>
-              <a:t>25.05.2022</a:t>
+              <a:t>30.05.2022</a:t>
             </a:fld>
             <a:endParaRPr lang="tr-TR"/>
           </a:p>
@@ -5221,6 +5232,293 @@
 </p:sld>
 </file>
 
+<file path=ppt/slides/slide8.xml><?xml version="1.0" encoding="utf-8"?>
+<p:sld xmlns:a="http://schemas.openxmlformats.org/drawingml/2006/main" xmlns:r="http://schemas.openxmlformats.org/officeDocument/2006/relationships" xmlns:p="http://schemas.openxmlformats.org/presentationml/2006/main">
+  <p:cSld>
+    <p:spTree>
+      <p:nvGrpSpPr>
+        <p:cNvPr id="1" name=""/>
+        <p:cNvGrpSpPr/>
+        <p:nvPr/>
+      </p:nvGrpSpPr>
+      <p:grpSpPr>
+        <a:xfrm>
+          <a:off x="0" y="0"/>
+          <a:ext cx="0" cy="0"/>
+          <a:chOff x="0" y="0"/>
+          <a:chExt cx="0" cy="0"/>
+        </a:xfrm>
+      </p:grpSpPr>
+      <p:sp>
+        <p:nvSpPr>
+          <p:cNvPr id="2" name="Başlık 1">
+            <a:extLst>
+              <a:ext uri="{FF2B5EF4-FFF2-40B4-BE49-F238E27FC236}">
+                <a16:creationId xmlns:a16="http://schemas.microsoft.com/office/drawing/2014/main" id="{119C0AEB-FDA4-0175-8E2E-5EA61F3987EA}"/>
+              </a:ext>
+            </a:extLst>
+          </p:cNvPr>
+          <p:cNvSpPr>
+            <a:spLocks noGrp="1"/>
+          </p:cNvSpPr>
+          <p:nvPr>
+            <p:ph type="title"/>
+          </p:nvPr>
+        </p:nvSpPr>
+        <p:spPr/>
+        <p:txBody>
+          <a:bodyPr/>
+          <a:lstStyle/>
+          <a:p>
+            <a:r>
+              <a:rPr lang="tr-TR" dirty="0" err="1"/>
+              <a:t>Bootstrap</a:t>
+            </a:r>
+            <a:r>
+              <a:rPr lang="tr-TR" dirty="0"/>
+              <a:t> </a:t>
+            </a:r>
+            <a:r>
+              <a:rPr lang="tr-TR" dirty="0" err="1"/>
+              <a:t>Integrity</a:t>
+            </a:r>
+            <a:r>
+              <a:rPr lang="tr-TR" dirty="0"/>
+              <a:t> ve </a:t>
+            </a:r>
+            <a:r>
+              <a:rPr lang="tr-TR" dirty="0" err="1"/>
+              <a:t>Crossorigin</a:t>
+            </a:r>
+            <a:r>
+              <a:rPr lang="tr-TR" dirty="0"/>
+              <a:t> nedir?</a:t>
+            </a:r>
+          </a:p>
+        </p:txBody>
+      </p:sp>
+      <p:sp>
+        <p:nvSpPr>
+          <p:cNvPr id="3" name="İçerik Yer Tutucusu 2">
+            <a:extLst>
+              <a:ext uri="{FF2B5EF4-FFF2-40B4-BE49-F238E27FC236}">
+                <a16:creationId xmlns:a16="http://schemas.microsoft.com/office/drawing/2014/main" id="{3A7C70F4-EE1D-8CAB-309E-F9BF16EECCF4}"/>
+              </a:ext>
+            </a:extLst>
+          </p:cNvPr>
+          <p:cNvSpPr>
+            <a:spLocks noGrp="1"/>
+          </p:cNvSpPr>
+          <p:nvPr>
+            <p:ph idx="1"/>
+          </p:nvPr>
+        </p:nvSpPr>
+        <p:spPr/>
+        <p:txBody>
+          <a:bodyPr>
+            <a:normAutofit/>
+          </a:bodyPr>
+          <a:lstStyle/>
+          <a:p>
+            <a:pPr marL="0" indent="0">
+              <a:buNone/>
+            </a:pPr>
+            <a:r>
+              <a:rPr lang="tr-TR" sz="2400" dirty="0" err="1">
+                <a:highlight>
+                  <a:srgbClr val="FFFF00"/>
+                </a:highlight>
+              </a:rPr>
+              <a:t>Integrity</a:t>
+            </a:r>
+            <a:r>
+              <a:rPr lang="tr-TR" sz="2400" dirty="0">
+                <a:highlight>
+                  <a:srgbClr val="FFFF00"/>
+                </a:highlight>
+              </a:rPr>
+              <a:t>:</a:t>
+            </a:r>
+            <a:r>
+              <a:rPr lang="tr-TR" sz="2400" dirty="0"/>
+              <a:t> Sunucudan gelen ve tarayıcıda çalışan sayfada kaynak değiştirilmişse kodun yüklenmediğinden emin olmak için tarayıcının kaynağı kontrol etmesine yardımcı olan bir mekanizma tanımlar.</a:t>
+            </a:r>
+          </a:p>
+          <a:p>
+            <a:pPr marL="0" indent="0">
+              <a:buNone/>
+            </a:pPr>
+            <a:endParaRPr lang="tr-TR" sz="2400" dirty="0"/>
+          </a:p>
+          <a:p>
+            <a:pPr marL="0" indent="0">
+              <a:buNone/>
+            </a:pPr>
+            <a:r>
+              <a:rPr lang="tr-TR" sz="2400" dirty="0" err="1">
+                <a:highlight>
+                  <a:srgbClr val="FFFF00"/>
+                </a:highlight>
+              </a:rPr>
+              <a:t>Crossorigin</a:t>
+            </a:r>
+            <a:r>
+              <a:rPr lang="tr-TR" sz="2400" dirty="0">
+                <a:highlight>
+                  <a:srgbClr val="FFFF00"/>
+                </a:highlight>
+              </a:rPr>
+              <a:t>:</a:t>
+            </a:r>
+            <a:r>
+              <a:rPr lang="tr-TR" sz="2400" dirty="0"/>
+              <a:t> Aynı kaynaktan yüklenmediğinde artık SRI denetiminin gereği olan CORS kullanılarak bir istek yüklendiğinde mevcuttur.</a:t>
+            </a:r>
+          </a:p>
+        </p:txBody>
+      </p:sp>
+    </p:spTree>
+    <p:extLst>
+      <p:ext uri="{BB962C8B-B14F-4D97-AF65-F5344CB8AC3E}">
+        <p14:creationId xmlns:p14="http://schemas.microsoft.com/office/powerpoint/2010/main" val="1076350831"/>
+      </p:ext>
+    </p:extLst>
+  </p:cSld>
+  <p:clrMapOvr>
+    <a:masterClrMapping/>
+  </p:clrMapOvr>
+</p:sld>
+</file>
+
+<file path=ppt/slides/slide9.xml><?xml version="1.0" encoding="utf-8"?>
+<p:sld xmlns:a="http://schemas.openxmlformats.org/drawingml/2006/main" xmlns:r="http://schemas.openxmlformats.org/officeDocument/2006/relationships" xmlns:p="http://schemas.openxmlformats.org/presentationml/2006/main">
+  <p:cSld>
+    <p:spTree>
+      <p:nvGrpSpPr>
+        <p:cNvPr id="1" name=""/>
+        <p:cNvGrpSpPr/>
+        <p:nvPr/>
+      </p:nvGrpSpPr>
+      <p:grpSpPr>
+        <a:xfrm>
+          <a:off x="0" y="0"/>
+          <a:ext cx="0" cy="0"/>
+          <a:chOff x="0" y="0"/>
+          <a:chExt cx="0" cy="0"/>
+        </a:xfrm>
+      </p:grpSpPr>
+      <p:sp>
+        <p:nvSpPr>
+          <p:cNvPr id="2" name="Başlık 1">
+            <a:extLst>
+              <a:ext uri="{FF2B5EF4-FFF2-40B4-BE49-F238E27FC236}">
+                <a16:creationId xmlns:a16="http://schemas.microsoft.com/office/drawing/2014/main" id="{FAD87025-1073-5DA7-CE82-DE3934E52C9F}"/>
+              </a:ext>
+            </a:extLst>
+          </p:cNvPr>
+          <p:cNvSpPr>
+            <a:spLocks noGrp="1"/>
+          </p:cNvSpPr>
+          <p:nvPr>
+            <p:ph type="title"/>
+          </p:nvPr>
+        </p:nvSpPr>
+        <p:spPr/>
+        <p:txBody>
+          <a:bodyPr/>
+          <a:lstStyle/>
+          <a:p>
+            <a:r>
+              <a:rPr lang="tr-TR" dirty="0" err="1"/>
+              <a:t>Scrollspy</a:t>
+            </a:r>
+            <a:r>
+              <a:rPr lang="tr-TR" dirty="0"/>
+              <a:t> nedir ? </a:t>
+            </a:r>
+          </a:p>
+        </p:txBody>
+      </p:sp>
+      <p:sp>
+        <p:nvSpPr>
+          <p:cNvPr id="3" name="İçerik Yer Tutucusu 2">
+            <a:extLst>
+              <a:ext uri="{FF2B5EF4-FFF2-40B4-BE49-F238E27FC236}">
+                <a16:creationId xmlns:a16="http://schemas.microsoft.com/office/drawing/2014/main" id="{C0178AE8-9667-21B2-F548-F9B36722B769}"/>
+              </a:ext>
+            </a:extLst>
+          </p:cNvPr>
+          <p:cNvSpPr>
+            <a:spLocks noGrp="1"/>
+          </p:cNvSpPr>
+          <p:nvPr>
+            <p:ph idx="1"/>
+          </p:nvPr>
+        </p:nvSpPr>
+        <p:spPr/>
+        <p:txBody>
+          <a:bodyPr>
+            <a:normAutofit/>
+          </a:bodyPr>
+          <a:lstStyle/>
+          <a:p>
+            <a:r>
+              <a:rPr lang="tr-TR" sz="2400" b="0" i="0" dirty="0">
+                <a:solidFill>
+                  <a:srgbClr val="484848"/>
+                </a:solidFill>
+                <a:effectLst/>
+                <a:latin typeface="Montserrat" panose="00000500000000000000" pitchFamily="2" charset="-94"/>
+              </a:rPr>
+              <a:t>Yatay </a:t>
+            </a:r>
+            <a:r>
+              <a:rPr lang="tr-TR" sz="2400" b="1" i="0" dirty="0" err="1">
+                <a:solidFill>
+                  <a:srgbClr val="484848"/>
+                </a:solidFill>
+                <a:effectLst/>
+                <a:latin typeface="Montserrat" panose="00000500000000000000" pitchFamily="2" charset="-94"/>
+              </a:rPr>
+              <a:t>scroll</a:t>
+            </a:r>
+            <a:r>
+              <a:rPr lang="tr-TR" sz="2400" b="1" i="0" dirty="0">
+                <a:solidFill>
+                  <a:srgbClr val="484848"/>
+                </a:solidFill>
+                <a:effectLst/>
+                <a:latin typeface="Montserrat" panose="00000500000000000000" pitchFamily="2" charset="-94"/>
+              </a:rPr>
+              <a:t> </a:t>
+            </a:r>
+            <a:r>
+              <a:rPr lang="tr-TR" sz="2400" b="0" i="0" dirty="0">
+                <a:solidFill>
+                  <a:srgbClr val="484848"/>
+                </a:solidFill>
+                <a:effectLst/>
+                <a:latin typeface="Montserrat" panose="00000500000000000000" pitchFamily="2" charset="-94"/>
+              </a:rPr>
+              <a:t>barı (kaydırma çubuğu) hareket ettirdiğimizde görüntülenen içerik ile ilişkili link etiketini aktif hale getirmek için kullanıyoruz.</a:t>
+            </a:r>
+            <a:endParaRPr lang="tr-TR" sz="2400" dirty="0"/>
+          </a:p>
+        </p:txBody>
+      </p:sp>
+    </p:spTree>
+    <p:extLst>
+      <p:ext uri="{BB962C8B-B14F-4D97-AF65-F5344CB8AC3E}">
+        <p14:creationId xmlns:p14="http://schemas.microsoft.com/office/powerpoint/2010/main" val="4241305931"/>
+      </p:ext>
+    </p:extLst>
+  </p:cSld>
+  <p:clrMapOvr>
+    <a:masterClrMapping/>
+  </p:clrMapOvr>
+</p:sld>
+</file>
+
 <file path=ppt/theme/theme1.xml><?xml version="1.0" encoding="utf-8"?>
 <a:theme xmlns:a="http://schemas.openxmlformats.org/drawingml/2006/main" name="Office Teması">
   <a:themeElements>

</xml_diff>

<commit_message>
different to Rebase and fast-forward added to research assigments
</commit_message>
<xml_diff>
--- a/research assignments.pptx
+++ b/research assignments.pptx
@@ -14,6 +14,7 @@
     <p:sldId id="262" r:id="rId8"/>
     <p:sldId id="263" r:id="rId9"/>
     <p:sldId id="264" r:id="rId10"/>
+    <p:sldId id="265" r:id="rId11"/>
   </p:sldIdLst>
   <p:sldSz cx="12192000" cy="6858000"/>
   <p:notesSz cx="6858000" cy="9144000"/>
@@ -136,6 +137,11 @@
             <p14:sldId id="264"/>
           </p14:sldIdLst>
         </p14:section>
+        <p14:section name="Lesson4 Homework" id="{8104C5CA-9CBD-4B62-8FB5-9836360661DE}">
+          <p14:sldIdLst>
+            <p14:sldId id="265"/>
+          </p14:sldIdLst>
+        </p14:section>
       </p14:sectionLst>
     </p:ext>
     <p:ext uri="{EFAFB233-063F-42B5-8137-9DF3F51BA10A}">
@@ -292,7 +298,7 @@
           <a:p>
             <a:fld id="{27CD8FDA-3F50-4BD8-9920-4DC7AE6B014B}" type="datetimeFigureOut">
               <a:rPr lang="tr-TR" smtClean="0"/>
-              <a:t>30.05.2022</a:t>
+              <a:t>1.06.2022</a:t>
             </a:fld>
             <a:endParaRPr lang="tr-TR"/>
           </a:p>
@@ -490,7 +496,7 @@
           <a:p>
             <a:fld id="{27CD8FDA-3F50-4BD8-9920-4DC7AE6B014B}" type="datetimeFigureOut">
               <a:rPr lang="tr-TR" smtClean="0"/>
-              <a:t>30.05.2022</a:t>
+              <a:t>1.06.2022</a:t>
             </a:fld>
             <a:endParaRPr lang="tr-TR"/>
           </a:p>
@@ -698,7 +704,7 @@
           <a:p>
             <a:fld id="{27CD8FDA-3F50-4BD8-9920-4DC7AE6B014B}" type="datetimeFigureOut">
               <a:rPr lang="tr-TR" smtClean="0"/>
-              <a:t>30.05.2022</a:t>
+              <a:t>1.06.2022</a:t>
             </a:fld>
             <a:endParaRPr lang="tr-TR"/>
           </a:p>
@@ -896,7 +902,7 @@
           <a:p>
             <a:fld id="{27CD8FDA-3F50-4BD8-9920-4DC7AE6B014B}" type="datetimeFigureOut">
               <a:rPr lang="tr-TR" smtClean="0"/>
-              <a:t>30.05.2022</a:t>
+              <a:t>1.06.2022</a:t>
             </a:fld>
             <a:endParaRPr lang="tr-TR"/>
           </a:p>
@@ -1171,7 +1177,7 @@
           <a:p>
             <a:fld id="{27CD8FDA-3F50-4BD8-9920-4DC7AE6B014B}" type="datetimeFigureOut">
               <a:rPr lang="tr-TR" smtClean="0"/>
-              <a:t>30.05.2022</a:t>
+              <a:t>1.06.2022</a:t>
             </a:fld>
             <a:endParaRPr lang="tr-TR"/>
           </a:p>
@@ -1436,7 +1442,7 @@
           <a:p>
             <a:fld id="{27CD8FDA-3F50-4BD8-9920-4DC7AE6B014B}" type="datetimeFigureOut">
               <a:rPr lang="tr-TR" smtClean="0"/>
-              <a:t>30.05.2022</a:t>
+              <a:t>1.06.2022</a:t>
             </a:fld>
             <a:endParaRPr lang="tr-TR"/>
           </a:p>
@@ -1848,7 +1854,7 @@
           <a:p>
             <a:fld id="{27CD8FDA-3F50-4BD8-9920-4DC7AE6B014B}" type="datetimeFigureOut">
               <a:rPr lang="tr-TR" smtClean="0"/>
-              <a:t>30.05.2022</a:t>
+              <a:t>1.06.2022</a:t>
             </a:fld>
             <a:endParaRPr lang="tr-TR"/>
           </a:p>
@@ -1989,7 +1995,7 @@
           <a:p>
             <a:fld id="{27CD8FDA-3F50-4BD8-9920-4DC7AE6B014B}" type="datetimeFigureOut">
               <a:rPr lang="tr-TR" smtClean="0"/>
-              <a:t>30.05.2022</a:t>
+              <a:t>1.06.2022</a:t>
             </a:fld>
             <a:endParaRPr lang="tr-TR"/>
           </a:p>
@@ -2102,7 +2108,7 @@
           <a:p>
             <a:fld id="{27CD8FDA-3F50-4BD8-9920-4DC7AE6B014B}" type="datetimeFigureOut">
               <a:rPr lang="tr-TR" smtClean="0"/>
-              <a:t>30.05.2022</a:t>
+              <a:t>1.06.2022</a:t>
             </a:fld>
             <a:endParaRPr lang="tr-TR"/>
           </a:p>
@@ -2413,7 +2419,7 @@
           <a:p>
             <a:fld id="{27CD8FDA-3F50-4BD8-9920-4DC7AE6B014B}" type="datetimeFigureOut">
               <a:rPr lang="tr-TR" smtClean="0"/>
-              <a:t>30.05.2022</a:t>
+              <a:t>1.06.2022</a:t>
             </a:fld>
             <a:endParaRPr lang="tr-TR"/>
           </a:p>
@@ -2701,7 +2707,7 @@
           <a:p>
             <a:fld id="{27CD8FDA-3F50-4BD8-9920-4DC7AE6B014B}" type="datetimeFigureOut">
               <a:rPr lang="tr-TR" smtClean="0"/>
-              <a:t>30.05.2022</a:t>
+              <a:t>1.06.2022</a:t>
             </a:fld>
             <a:endParaRPr lang="tr-TR"/>
           </a:p>
@@ -2942,7 +2948,7 @@
           <a:p>
             <a:fld id="{27CD8FDA-3F50-4BD8-9920-4DC7AE6B014B}" type="datetimeFigureOut">
               <a:rPr lang="tr-TR" smtClean="0"/>
-              <a:t>30.05.2022</a:t>
+              <a:t>1.06.2022</a:t>
             </a:fld>
             <a:endParaRPr lang="tr-TR"/>
           </a:p>
@@ -3481,6 +3487,275 @@
 </p:sld>
 </file>
 
+<file path=ppt/slides/slide10.xml><?xml version="1.0" encoding="utf-8"?>
+<p:sld xmlns:a="http://schemas.openxmlformats.org/drawingml/2006/main" xmlns:r="http://schemas.openxmlformats.org/officeDocument/2006/relationships" xmlns:p="http://schemas.openxmlformats.org/presentationml/2006/main">
+  <p:cSld>
+    <p:spTree>
+      <p:nvGrpSpPr>
+        <p:cNvPr id="1" name=""/>
+        <p:cNvGrpSpPr/>
+        <p:nvPr/>
+      </p:nvGrpSpPr>
+      <p:grpSpPr>
+        <a:xfrm>
+          <a:off x="0" y="0"/>
+          <a:ext cx="0" cy="0"/>
+          <a:chOff x="0" y="0"/>
+          <a:chExt cx="0" cy="0"/>
+        </a:xfrm>
+      </p:grpSpPr>
+      <p:sp>
+        <p:nvSpPr>
+          <p:cNvPr id="2" name="Başlık 1">
+            <a:extLst>
+              <a:ext uri="{FF2B5EF4-FFF2-40B4-BE49-F238E27FC236}">
+                <a16:creationId xmlns:a16="http://schemas.microsoft.com/office/drawing/2014/main" id="{D08F3E1E-88A2-2F2C-57DC-578DA8B1CA86}"/>
+              </a:ext>
+            </a:extLst>
+          </p:cNvPr>
+          <p:cNvSpPr>
+            <a:spLocks noGrp="1"/>
+          </p:cNvSpPr>
+          <p:nvPr>
+            <p:ph type="title"/>
+          </p:nvPr>
+        </p:nvSpPr>
+        <p:spPr/>
+        <p:txBody>
+          <a:bodyPr/>
+          <a:lstStyle/>
+          <a:p>
+            <a:r>
+              <a:rPr lang="tr-TR" dirty="0" err="1"/>
+              <a:t>Fast-forward</a:t>
+            </a:r>
+            <a:r>
+              <a:rPr lang="tr-TR" dirty="0"/>
+              <a:t> – </a:t>
+            </a:r>
+            <a:r>
+              <a:rPr lang="tr-TR" dirty="0" err="1"/>
+              <a:t>Rebase</a:t>
+            </a:r>
+            <a:r>
+              <a:rPr lang="tr-TR" dirty="0"/>
+              <a:t> arasındaki fark?</a:t>
+            </a:r>
+          </a:p>
+        </p:txBody>
+      </p:sp>
+      <p:sp>
+        <p:nvSpPr>
+          <p:cNvPr id="3" name="İçerik Yer Tutucusu 2">
+            <a:extLst>
+              <a:ext uri="{FF2B5EF4-FFF2-40B4-BE49-F238E27FC236}">
+                <a16:creationId xmlns:a16="http://schemas.microsoft.com/office/drawing/2014/main" id="{F8491384-E716-65C6-10E2-2F351295EB7D}"/>
+              </a:ext>
+            </a:extLst>
+          </p:cNvPr>
+          <p:cNvSpPr>
+            <a:spLocks noGrp="1"/>
+          </p:cNvSpPr>
+          <p:nvPr>
+            <p:ph idx="1"/>
+          </p:nvPr>
+        </p:nvSpPr>
+        <p:spPr/>
+        <p:txBody>
+          <a:bodyPr>
+            <a:normAutofit/>
+          </a:bodyPr>
+          <a:lstStyle/>
+          <a:p>
+            <a:r>
+              <a:rPr lang="tr-TR" sz="2400" dirty="0" err="1"/>
+              <a:t>Fast-forward</a:t>
+            </a:r>
+            <a:r>
+              <a:rPr lang="tr-TR" sz="2400" dirty="0"/>
+              <a:t> oluşturduğumuz </a:t>
+            </a:r>
+            <a:r>
+              <a:rPr lang="tr-TR" sz="2400" dirty="0" err="1"/>
+              <a:t>branch</a:t>
+            </a:r>
+            <a:r>
+              <a:rPr lang="tr-TR" sz="2400" dirty="0"/>
+              <a:t> ile </a:t>
+            </a:r>
+            <a:r>
+              <a:rPr lang="tr-TR" sz="2400" dirty="0" err="1"/>
+              <a:t>master</a:t>
+            </a:r>
+            <a:r>
+              <a:rPr lang="tr-TR" sz="2400" dirty="0"/>
+              <a:t> </a:t>
+            </a:r>
+            <a:r>
+              <a:rPr lang="tr-TR" sz="2400" dirty="0" err="1"/>
+              <a:t>branch’i</a:t>
+            </a:r>
+            <a:r>
+              <a:rPr lang="tr-TR" sz="2400" dirty="0"/>
+              <a:t> </a:t>
+            </a:r>
+            <a:r>
+              <a:rPr lang="tr-TR" sz="2400" dirty="0" err="1"/>
+              <a:t>merge</a:t>
+            </a:r>
+            <a:r>
+              <a:rPr lang="tr-TR" sz="2400" dirty="0"/>
+              <a:t> edileceği zaman </a:t>
+            </a:r>
+            <a:r>
+              <a:rPr lang="tr-TR" sz="2400" dirty="0" err="1"/>
+              <a:t>eğerki</a:t>
+            </a:r>
+            <a:r>
+              <a:rPr lang="tr-TR" sz="2400" dirty="0"/>
+              <a:t> </a:t>
+            </a:r>
+            <a:r>
+              <a:rPr lang="tr-TR" sz="2400" dirty="0" err="1"/>
+              <a:t>master</a:t>
+            </a:r>
+            <a:r>
+              <a:rPr lang="tr-TR" sz="2400" dirty="0"/>
+              <a:t> </a:t>
+            </a:r>
+            <a:r>
+              <a:rPr lang="tr-TR" sz="2400" dirty="0" err="1"/>
+              <a:t>branch’inde</a:t>
+            </a:r>
+            <a:r>
+              <a:rPr lang="tr-TR" sz="2400" dirty="0"/>
+              <a:t> herhangi bir değişiklik yoksa değişiklik sanki </a:t>
+            </a:r>
+            <a:r>
+              <a:rPr lang="tr-TR" sz="2400" dirty="0" err="1"/>
+              <a:t>master</a:t>
+            </a:r>
+            <a:r>
+              <a:rPr lang="tr-TR" sz="2400" dirty="0"/>
+              <a:t> </a:t>
+            </a:r>
+            <a:r>
+              <a:rPr lang="tr-TR" sz="2400" dirty="0" err="1"/>
+              <a:t>branch’inde</a:t>
+            </a:r>
+            <a:r>
+              <a:rPr lang="tr-TR" sz="2400" dirty="0"/>
+              <a:t> yapılmış gibi </a:t>
+            </a:r>
+            <a:r>
+              <a:rPr lang="tr-TR" sz="2400" dirty="0" err="1"/>
+              <a:t>master</a:t>
+            </a:r>
+            <a:r>
+              <a:rPr lang="tr-TR" sz="2400" dirty="0"/>
+              <a:t> </a:t>
+            </a:r>
+            <a:r>
+              <a:rPr lang="tr-TR" sz="2400" dirty="0" err="1"/>
+              <a:t>branch’i</a:t>
+            </a:r>
+            <a:r>
+              <a:rPr lang="tr-TR" sz="2400" dirty="0"/>
+              <a:t> </a:t>
+            </a:r>
+            <a:r>
+              <a:rPr lang="tr-TR" sz="2400" dirty="0" err="1"/>
+              <a:t>commit</a:t>
+            </a:r>
+            <a:r>
+              <a:rPr lang="tr-TR" sz="2400" dirty="0"/>
+              <a:t> olarak gönderdiğimiz </a:t>
+            </a:r>
+            <a:r>
+              <a:rPr lang="tr-TR" sz="2400" dirty="0" err="1"/>
+              <a:t>branch’in</a:t>
+            </a:r>
+            <a:r>
+              <a:rPr lang="tr-TR" sz="2400" dirty="0"/>
+              <a:t> </a:t>
+            </a:r>
+            <a:r>
+              <a:rPr lang="tr-TR" sz="2400" dirty="0" err="1"/>
+              <a:t>commitinin</a:t>
+            </a:r>
+            <a:r>
+              <a:rPr lang="tr-TR" sz="2400" dirty="0"/>
+              <a:t> </a:t>
+            </a:r>
+            <a:r>
+              <a:rPr lang="tr-TR" sz="2400" dirty="0" err="1"/>
+              <a:t>hash’ini</a:t>
+            </a:r>
+            <a:r>
+              <a:rPr lang="tr-TR" sz="2400" dirty="0"/>
+              <a:t> alır.</a:t>
+            </a:r>
+          </a:p>
+          <a:p>
+            <a:endParaRPr lang="tr-TR" sz="2400" dirty="0"/>
+          </a:p>
+          <a:p>
+            <a:r>
+              <a:rPr lang="tr-TR" sz="2400" dirty="0" err="1"/>
+              <a:t>Rebase</a:t>
+            </a:r>
+            <a:r>
+              <a:rPr lang="tr-TR" sz="2400" dirty="0"/>
+              <a:t>: </a:t>
+            </a:r>
+            <a:r>
+              <a:rPr lang="tr-TR" sz="2400" dirty="0" err="1"/>
+              <a:t>Merge</a:t>
+            </a:r>
+            <a:r>
+              <a:rPr lang="tr-TR" sz="2400" dirty="0"/>
+              <a:t> gibi birleştirme işlemi yapar. Farkı ise proje tarihçesi oluştururken ciddi farklar var. A ve B </a:t>
+            </a:r>
+            <a:r>
+              <a:rPr lang="tr-TR" sz="2400" dirty="0" err="1"/>
+              <a:t>branchlerini</a:t>
+            </a:r>
+            <a:r>
+              <a:rPr lang="tr-TR" sz="2400" dirty="0"/>
+              <a:t> birleştirmek istiyoruz. Birleştirirken A </a:t>
+            </a:r>
+            <a:r>
+              <a:rPr lang="tr-TR" sz="2400" dirty="0" err="1"/>
+              <a:t>branch’indeki</a:t>
+            </a:r>
+            <a:r>
+              <a:rPr lang="tr-TR" sz="2400" dirty="0"/>
+              <a:t> değişiklikleri sanki B </a:t>
+            </a:r>
+            <a:r>
+              <a:rPr lang="tr-TR" sz="2400" dirty="0" err="1"/>
+              <a:t>branch’inde</a:t>
+            </a:r>
+            <a:r>
+              <a:rPr lang="tr-TR" sz="2400" dirty="0"/>
+              <a:t> yapılmış gibi yeniden yazar. B dalının tarihçesinde sanki tüm değişiklikler bu dalda olmuş gibi gözükür.</a:t>
+            </a:r>
+          </a:p>
+        </p:txBody>
+      </p:sp>
+    </p:spTree>
+    <p:extLst>
+      <p:ext uri="{BB962C8B-B14F-4D97-AF65-F5344CB8AC3E}">
+        <p14:creationId xmlns:p14="http://schemas.microsoft.com/office/powerpoint/2010/main" val="1185200844"/>
+      </p:ext>
+    </p:extLst>
+  </p:cSld>
+  <p:clrMapOvr>
+    <a:masterClrMapping/>
+  </p:clrMapOvr>
+</p:sld>
+</file>
+
 <file path=ppt/slides/slide2.xml><?xml version="1.0" encoding="utf-8"?>
 <p:sld xmlns:a="http://schemas.openxmlformats.org/drawingml/2006/main" xmlns:r="http://schemas.openxmlformats.org/officeDocument/2006/relationships" xmlns:p="http://schemas.openxmlformats.org/presentationml/2006/main">
   <p:cSld>

</xml_diff>